<commit_message>
Entrega dos desafios de TS
</commit_message>
<xml_diff>
--- a/Modulo 3 - Dominando a linguagem de Programação Javascript/12 - Prática do TypeScript/TypeScript.pptx
+++ b/Modulo 3 - Dominando a linguagem de Programação Javascript/12 - Prática do TypeScript/TypeScript.pptx
@@ -10,6 +10,7 @@
     <p:sldId id="259" r:id="rId4"/>
     <p:sldId id="260" r:id="rId5"/>
     <p:sldId id="262" r:id="rId6"/>
+    <p:sldId id="263" r:id="rId7"/>
   </p:sldIdLst>
   <p:sldSz cx="12192000" cy="6858000"/>
   <p:notesSz cx="6858000" cy="9144000"/>
@@ -263,7 +264,7 @@
           <a:p>
             <a:fld id="{567D4B56-2FE1-4CFD-8524-02599EECBD65}" type="datetimeFigureOut">
               <a:rPr lang="pt-BR" smtClean="0"/>
-              <a:t>07/07/2022</a:t>
+              <a:t>08/07/2022</a:t>
             </a:fld>
             <a:endParaRPr lang="pt-BR"/>
           </a:p>
@@ -461,7 +462,7 @@
           <a:p>
             <a:fld id="{567D4B56-2FE1-4CFD-8524-02599EECBD65}" type="datetimeFigureOut">
               <a:rPr lang="pt-BR" smtClean="0"/>
-              <a:t>07/07/2022</a:t>
+              <a:t>08/07/2022</a:t>
             </a:fld>
             <a:endParaRPr lang="pt-BR"/>
           </a:p>
@@ -669,7 +670,7 @@
           <a:p>
             <a:fld id="{567D4B56-2FE1-4CFD-8524-02599EECBD65}" type="datetimeFigureOut">
               <a:rPr lang="pt-BR" smtClean="0"/>
-              <a:t>07/07/2022</a:t>
+              <a:t>08/07/2022</a:t>
             </a:fld>
             <a:endParaRPr lang="pt-BR"/>
           </a:p>
@@ -867,7 +868,7 @@
           <a:p>
             <a:fld id="{567D4B56-2FE1-4CFD-8524-02599EECBD65}" type="datetimeFigureOut">
               <a:rPr lang="pt-BR" smtClean="0"/>
-              <a:t>07/07/2022</a:t>
+              <a:t>08/07/2022</a:t>
             </a:fld>
             <a:endParaRPr lang="pt-BR"/>
           </a:p>
@@ -1142,7 +1143,7 @@
           <a:p>
             <a:fld id="{567D4B56-2FE1-4CFD-8524-02599EECBD65}" type="datetimeFigureOut">
               <a:rPr lang="pt-BR" smtClean="0"/>
-              <a:t>07/07/2022</a:t>
+              <a:t>08/07/2022</a:t>
             </a:fld>
             <a:endParaRPr lang="pt-BR"/>
           </a:p>
@@ -1407,7 +1408,7 @@
           <a:p>
             <a:fld id="{567D4B56-2FE1-4CFD-8524-02599EECBD65}" type="datetimeFigureOut">
               <a:rPr lang="pt-BR" smtClean="0"/>
-              <a:t>07/07/2022</a:t>
+              <a:t>08/07/2022</a:t>
             </a:fld>
             <a:endParaRPr lang="pt-BR"/>
           </a:p>
@@ -1819,7 +1820,7 @@
           <a:p>
             <a:fld id="{567D4B56-2FE1-4CFD-8524-02599EECBD65}" type="datetimeFigureOut">
               <a:rPr lang="pt-BR" smtClean="0"/>
-              <a:t>07/07/2022</a:t>
+              <a:t>08/07/2022</a:t>
             </a:fld>
             <a:endParaRPr lang="pt-BR"/>
           </a:p>
@@ -1960,7 +1961,7 @@
           <a:p>
             <a:fld id="{567D4B56-2FE1-4CFD-8524-02599EECBD65}" type="datetimeFigureOut">
               <a:rPr lang="pt-BR" smtClean="0"/>
-              <a:t>07/07/2022</a:t>
+              <a:t>08/07/2022</a:t>
             </a:fld>
             <a:endParaRPr lang="pt-BR"/>
           </a:p>
@@ -2073,7 +2074,7 @@
           <a:p>
             <a:fld id="{567D4B56-2FE1-4CFD-8524-02599EECBD65}" type="datetimeFigureOut">
               <a:rPr lang="pt-BR" smtClean="0"/>
-              <a:t>07/07/2022</a:t>
+              <a:t>08/07/2022</a:t>
             </a:fld>
             <a:endParaRPr lang="pt-BR"/>
           </a:p>
@@ -2384,7 +2385,7 @@
           <a:p>
             <a:fld id="{567D4B56-2FE1-4CFD-8524-02599EECBD65}" type="datetimeFigureOut">
               <a:rPr lang="pt-BR" smtClean="0"/>
-              <a:t>07/07/2022</a:t>
+              <a:t>08/07/2022</a:t>
             </a:fld>
             <a:endParaRPr lang="pt-BR"/>
           </a:p>
@@ -2672,7 +2673,7 @@
           <a:p>
             <a:fld id="{567D4B56-2FE1-4CFD-8524-02599EECBD65}" type="datetimeFigureOut">
               <a:rPr lang="pt-BR" smtClean="0"/>
-              <a:t>07/07/2022</a:t>
+              <a:t>08/07/2022</a:t>
             </a:fld>
             <a:endParaRPr lang="pt-BR"/>
           </a:p>
@@ -2913,7 +2914,7 @@
           <a:p>
             <a:fld id="{567D4B56-2FE1-4CFD-8524-02599EECBD65}" type="datetimeFigureOut">
               <a:rPr lang="pt-BR" smtClean="0"/>
-              <a:t>07/07/2022</a:t>
+              <a:t>08/07/2022</a:t>
             </a:fld>
             <a:endParaRPr lang="pt-BR"/>
           </a:p>
@@ -3613,6 +3614,66 @@
 </p:sld>
 </file>
 
+<file path=ppt/slides/slide6.xml><?xml version="1.0" encoding="utf-8"?>
+<p:sld xmlns:a="http://schemas.openxmlformats.org/drawingml/2006/main" xmlns:r="http://schemas.openxmlformats.org/officeDocument/2006/relationships" xmlns:p="http://schemas.openxmlformats.org/presentationml/2006/main">
+  <p:cSld>
+    <p:spTree>
+      <p:nvGrpSpPr>
+        <p:cNvPr id="1" name=""/>
+        <p:cNvGrpSpPr/>
+        <p:nvPr/>
+      </p:nvGrpSpPr>
+      <p:grpSpPr>
+        <a:xfrm>
+          <a:off x="0" y="0"/>
+          <a:ext cx="0" cy="0"/>
+          <a:chOff x="0" y="0"/>
+          <a:chExt cx="0" cy="0"/>
+        </a:xfrm>
+      </p:grpSpPr>
+      <p:pic>
+        <p:nvPicPr>
+          <p:cNvPr id="4" name="Imagem 3">
+            <a:extLst>
+              <a:ext uri="{FF2B5EF4-FFF2-40B4-BE49-F238E27FC236}">
+                <a16:creationId xmlns:a16="http://schemas.microsoft.com/office/drawing/2014/main" id="{5FA58FED-BBCF-B33F-643E-CE9DCAAA975D}"/>
+              </a:ext>
+            </a:extLst>
+          </p:cNvPr>
+          <p:cNvPicPr>
+            <a:picLocks noChangeAspect="1"/>
+          </p:cNvPicPr>
+          <p:nvPr/>
+        </p:nvPicPr>
+        <p:blipFill>
+          <a:blip r:embed="rId2"/>
+          <a:stretch>
+            <a:fillRect/>
+          </a:stretch>
+        </p:blipFill>
+        <p:spPr>
+          <a:xfrm>
+            <a:off x="1294730" y="1280812"/>
+            <a:ext cx="9602540" cy="4296375"/>
+          </a:xfrm>
+          <a:prstGeom prst="rect">
+            <a:avLst/>
+          </a:prstGeom>
+        </p:spPr>
+      </p:pic>
+    </p:spTree>
+    <p:extLst>
+      <p:ext uri="{BB962C8B-B14F-4D97-AF65-F5344CB8AC3E}">
+        <p14:creationId xmlns:p14="http://schemas.microsoft.com/office/powerpoint/2010/main" val="3958075150"/>
+      </p:ext>
+    </p:extLst>
+  </p:cSld>
+  <p:clrMapOvr>
+    <a:masterClrMapping/>
+  </p:clrMapOvr>
+</p:sld>
+</file>
+
 <file path=ppt/theme/theme1.xml><?xml version="1.0" encoding="utf-8"?>
 <a:theme xmlns:a="http://schemas.openxmlformats.org/drawingml/2006/main" name="Tema do Office">
   <a:themeElements>

</xml_diff>